<commit_message>
Mapa de Navegacion parte 2
</commit_message>
<xml_diff>
--- a/MapaDeNavegacion.pptx
+++ b/MapaDeNavegacion.pptx
@@ -3933,7 +3933,7 @@
         </p:nvSpPr>
         <p:spPr>
           <a:xfrm>
-            <a:off x="7053945" y="120578"/>
+            <a:off x="7080961" y="46153"/>
             <a:ext cx="1828800" cy="1135464"/>
           </a:xfrm>
           <a:prstGeom prst="rect">
@@ -3995,7 +3995,7 @@
         </p:nvSpPr>
         <p:spPr>
           <a:xfrm>
-            <a:off x="9492728" y="120578"/>
+            <a:off x="10390591" y="70339"/>
             <a:ext cx="1538430" cy="773725"/>
           </a:xfrm>
           <a:prstGeom prst="rect">
@@ -4057,7 +4057,7 @@
         </p:nvSpPr>
         <p:spPr>
           <a:xfrm>
-            <a:off x="9374080" y="991017"/>
+            <a:off x="10199672" y="929468"/>
             <a:ext cx="1729349" cy="773725"/>
           </a:xfrm>
           <a:prstGeom prst="rect">
@@ -4202,13 +4202,14 @@
           </p:cNvPr>
           <p:cNvCxnSpPr>
             <a:cxnSpLocks/>
+            <a:endCxn id="46" idx="1"/>
           </p:cNvCxnSpPr>
           <p:nvPr/>
         </p:nvCxnSpPr>
         <p:spPr>
           <a:xfrm>
-            <a:off x="5642795" y="894303"/>
-            <a:ext cx="1411150" cy="0"/>
+            <a:off x="5642795" y="495629"/>
+            <a:ext cx="1438166" cy="118256"/>
           </a:xfrm>
           <a:prstGeom prst="straightConnector1">
             <a:avLst/>
@@ -4245,13 +4246,14 @@
           <p:cNvCxnSpPr>
             <a:cxnSpLocks/>
             <a:stCxn id="46" idx="3"/>
+            <a:endCxn id="53" idx="1"/>
           </p:cNvCxnSpPr>
           <p:nvPr/>
         </p:nvCxnSpPr>
         <p:spPr>
-          <a:xfrm>
-            <a:off x="8882745" y="688310"/>
-            <a:ext cx="609983" cy="0"/>
+          <a:xfrm flipV="1">
+            <a:off x="8909761" y="457202"/>
+            <a:ext cx="1480830" cy="156683"/>
           </a:xfrm>
           <a:prstGeom prst="straightConnector1">
             <a:avLst/>
@@ -4287,13 +4289,15 @@
           </p:cNvPr>
           <p:cNvCxnSpPr>
             <a:cxnSpLocks/>
+            <a:stCxn id="46" idx="3"/>
+            <a:endCxn id="54" idx="1"/>
           </p:cNvCxnSpPr>
           <p:nvPr/>
         </p:nvCxnSpPr>
         <p:spPr>
           <a:xfrm>
-            <a:off x="8882745" y="894304"/>
-            <a:ext cx="491335" cy="221064"/>
+            <a:off x="8909761" y="613885"/>
+            <a:ext cx="1289911" cy="702446"/>
           </a:xfrm>
           <a:prstGeom prst="straightConnector1">
             <a:avLst/>
@@ -4970,6 +4974,1012 @@
           <a:xfrm flipH="1">
             <a:off x="2719459" y="5936266"/>
             <a:ext cx="1842148" cy="658844"/>
+          </a:xfrm>
+          <a:prstGeom prst="straightConnector1">
+            <a:avLst/>
+          </a:prstGeom>
+          <a:ln>
+            <a:tailEnd type="triangle"/>
+          </a:ln>
+          <a:effectLst/>
+        </p:spPr>
+        <p:style>
+          <a:lnRef idx="3">
+            <a:schemeClr val="dk1"/>
+          </a:lnRef>
+          <a:fillRef idx="0">
+            <a:schemeClr val="dk1"/>
+          </a:fillRef>
+          <a:effectRef idx="2">
+            <a:schemeClr val="dk1"/>
+          </a:effectRef>
+          <a:fontRef idx="minor">
+            <a:schemeClr val="tx1"/>
+          </a:fontRef>
+        </p:style>
+      </p:cxnSp>
+      <p:cxnSp>
+        <p:nvCxnSpPr>
+          <p:cNvPr id="154" name="Straight Arrow Connector 153">
+            <a:extLst>
+              <a:ext uri="{FF2B5EF4-FFF2-40B4-BE49-F238E27FC236}">
+                <a16:creationId xmlns:a16="http://schemas.microsoft.com/office/drawing/2014/main" id="{C5CC8E96-AFD4-43B3-A4D6-01B43FB68E1B}"/>
+              </a:ext>
+            </a:extLst>
+          </p:cNvPr>
+          <p:cNvCxnSpPr>
+            <a:cxnSpLocks/>
+            <a:endCxn id="158" idx="0"/>
+          </p:cNvCxnSpPr>
+          <p:nvPr/>
+        </p:nvCxnSpPr>
+        <p:spPr>
+          <a:xfrm flipH="1">
+            <a:off x="6684229" y="1062785"/>
+            <a:ext cx="444291" cy="327385"/>
+          </a:xfrm>
+          <a:prstGeom prst="straightConnector1">
+            <a:avLst/>
+          </a:prstGeom>
+          <a:ln>
+            <a:tailEnd type="triangle"/>
+          </a:ln>
+          <a:effectLst/>
+        </p:spPr>
+        <p:style>
+          <a:lnRef idx="3">
+            <a:schemeClr val="dk1"/>
+          </a:lnRef>
+          <a:fillRef idx="0">
+            <a:schemeClr val="dk1"/>
+          </a:fillRef>
+          <a:effectRef idx="2">
+            <a:schemeClr val="dk1"/>
+          </a:effectRef>
+          <a:fontRef idx="minor">
+            <a:schemeClr val="tx1"/>
+          </a:fontRef>
+        </p:style>
+      </p:cxnSp>
+      <p:sp>
+        <p:nvSpPr>
+          <p:cNvPr id="158" name="Rectangle 157">
+            <a:extLst>
+              <a:ext uri="{FF2B5EF4-FFF2-40B4-BE49-F238E27FC236}">
+                <a16:creationId xmlns:a16="http://schemas.microsoft.com/office/drawing/2014/main" id="{F7B50732-B529-4298-967D-EAE7568FAB46}"/>
+              </a:ext>
+            </a:extLst>
+          </p:cNvPr>
+          <p:cNvSpPr/>
+          <p:nvPr/>
+        </p:nvSpPr>
+        <p:spPr>
+          <a:xfrm>
+            <a:off x="5861442" y="1390170"/>
+            <a:ext cx="1645574" cy="456077"/>
+          </a:xfrm>
+          <a:prstGeom prst="rect">
+            <a:avLst/>
+          </a:prstGeom>
+          <a:solidFill>
+            <a:schemeClr val="accent1">
+              <a:lumMod val="40000"/>
+              <a:lumOff val="60000"/>
+            </a:schemeClr>
+          </a:solidFill>
+        </p:spPr>
+        <p:style>
+          <a:lnRef idx="0">
+            <a:schemeClr val="accent1"/>
+          </a:lnRef>
+          <a:fillRef idx="3">
+            <a:schemeClr val="accent1"/>
+          </a:fillRef>
+          <a:effectRef idx="3">
+            <a:schemeClr val="accent1"/>
+          </a:effectRef>
+          <a:fontRef idx="minor">
+            <a:schemeClr val="lt1"/>
+          </a:fontRef>
+        </p:style>
+        <p:txBody>
+          <a:bodyPr rtlCol="0" anchor="ctr"/>
+          <a:lstStyle/>
+          <a:p>
+            <a:pPr algn="ctr"/>
+            <a:r>
+              <a:rPr lang="es-CO" dirty="0">
+                <a:ln>
+                  <a:solidFill>
+                    <a:schemeClr val="tx1"/>
+                  </a:solidFill>
+                </a:ln>
+                <a:solidFill>
+                  <a:schemeClr val="tx1"/>
+                </a:solidFill>
+              </a:rPr>
+              <a:t>Agendamientos nuevo</a:t>
+            </a:r>
+          </a:p>
+        </p:txBody>
+      </p:sp>
+      <p:sp>
+        <p:nvSpPr>
+          <p:cNvPr id="159" name="Rectangle 158">
+            <a:extLst>
+              <a:ext uri="{FF2B5EF4-FFF2-40B4-BE49-F238E27FC236}">
+                <a16:creationId xmlns:a16="http://schemas.microsoft.com/office/drawing/2014/main" id="{B61A9CDD-D14C-4282-A51E-7DB694FF7C93}"/>
+              </a:ext>
+            </a:extLst>
+          </p:cNvPr>
+          <p:cNvSpPr/>
+          <p:nvPr/>
+        </p:nvSpPr>
+        <p:spPr>
+          <a:xfrm>
+            <a:off x="5885547" y="2223766"/>
+            <a:ext cx="1645574" cy="652956"/>
+          </a:xfrm>
+          <a:prstGeom prst="rect">
+            <a:avLst/>
+          </a:prstGeom>
+          <a:solidFill>
+            <a:schemeClr val="accent1">
+              <a:lumMod val="40000"/>
+              <a:lumOff val="60000"/>
+            </a:schemeClr>
+          </a:solidFill>
+        </p:spPr>
+        <p:style>
+          <a:lnRef idx="0">
+            <a:schemeClr val="accent1"/>
+          </a:lnRef>
+          <a:fillRef idx="3">
+            <a:schemeClr val="accent1"/>
+          </a:fillRef>
+          <a:effectRef idx="3">
+            <a:schemeClr val="accent1"/>
+          </a:effectRef>
+          <a:fontRef idx="minor">
+            <a:schemeClr val="lt1"/>
+          </a:fontRef>
+        </p:style>
+        <p:txBody>
+          <a:bodyPr rtlCol="0" anchor="ctr"/>
+          <a:lstStyle/>
+          <a:p>
+            <a:pPr algn="ctr"/>
+            <a:r>
+              <a:rPr lang="es-CO" dirty="0">
+                <a:ln>
+                  <a:solidFill>
+                    <a:schemeClr val="tx1"/>
+                  </a:solidFill>
+                </a:ln>
+                <a:solidFill>
+                  <a:schemeClr val="tx1"/>
+                </a:solidFill>
+              </a:rPr>
+              <a:t>Agendamientos Editar</a:t>
+            </a:r>
+          </a:p>
+        </p:txBody>
+      </p:sp>
+      <p:sp>
+        <p:nvSpPr>
+          <p:cNvPr id="160" name="Rectangle 159">
+            <a:extLst>
+              <a:ext uri="{FF2B5EF4-FFF2-40B4-BE49-F238E27FC236}">
+                <a16:creationId xmlns:a16="http://schemas.microsoft.com/office/drawing/2014/main" id="{9DDE896F-D5CC-41EE-9C61-7128458A832B}"/>
+              </a:ext>
+            </a:extLst>
+          </p:cNvPr>
+          <p:cNvSpPr/>
+          <p:nvPr/>
+        </p:nvSpPr>
+        <p:spPr>
+          <a:xfrm>
+            <a:off x="7669304" y="2029562"/>
+            <a:ext cx="1645574" cy="456077"/>
+          </a:xfrm>
+          <a:prstGeom prst="rect">
+            <a:avLst/>
+          </a:prstGeom>
+          <a:solidFill>
+            <a:schemeClr val="accent1">
+              <a:lumMod val="40000"/>
+              <a:lumOff val="60000"/>
+            </a:schemeClr>
+          </a:solidFill>
+        </p:spPr>
+        <p:style>
+          <a:lnRef idx="0">
+            <a:schemeClr val="accent1"/>
+          </a:lnRef>
+          <a:fillRef idx="3">
+            <a:schemeClr val="accent1"/>
+          </a:fillRef>
+          <a:effectRef idx="3">
+            <a:schemeClr val="accent1"/>
+          </a:effectRef>
+          <a:fontRef idx="minor">
+            <a:schemeClr val="lt1"/>
+          </a:fontRef>
+        </p:style>
+        <p:txBody>
+          <a:bodyPr rtlCol="0" anchor="ctr"/>
+          <a:lstStyle/>
+          <a:p>
+            <a:pPr algn="ctr"/>
+            <a:r>
+              <a:rPr lang="es-CO" dirty="0">
+                <a:ln>
+                  <a:solidFill>
+                    <a:schemeClr val="tx1"/>
+                  </a:solidFill>
+                </a:ln>
+                <a:solidFill>
+                  <a:schemeClr val="tx1"/>
+                </a:solidFill>
+              </a:rPr>
+              <a:t>Agendamientos</a:t>
+            </a:r>
+          </a:p>
+          <a:p>
+            <a:pPr algn="ctr"/>
+            <a:r>
+              <a:rPr lang="es-CO" dirty="0">
+                <a:ln>
+                  <a:solidFill>
+                    <a:schemeClr val="tx1"/>
+                  </a:solidFill>
+                </a:ln>
+                <a:solidFill>
+                  <a:schemeClr val="tx1"/>
+                </a:solidFill>
+              </a:rPr>
+              <a:t>mes</a:t>
+            </a:r>
+          </a:p>
+        </p:txBody>
+      </p:sp>
+      <p:cxnSp>
+        <p:nvCxnSpPr>
+          <p:cNvPr id="177" name="Straight Arrow Connector 176">
+            <a:extLst>
+              <a:ext uri="{FF2B5EF4-FFF2-40B4-BE49-F238E27FC236}">
+                <a16:creationId xmlns:a16="http://schemas.microsoft.com/office/drawing/2014/main" id="{BE99C7BD-9796-4671-A69B-F6107C505F5D}"/>
+              </a:ext>
+            </a:extLst>
+          </p:cNvPr>
+          <p:cNvCxnSpPr>
+            <a:cxnSpLocks/>
+          </p:cNvCxnSpPr>
+          <p:nvPr/>
+        </p:nvCxnSpPr>
+        <p:spPr>
+          <a:xfrm>
+            <a:off x="7507016" y="1181617"/>
+            <a:ext cx="516091" cy="816853"/>
+          </a:xfrm>
+          <a:prstGeom prst="straightConnector1">
+            <a:avLst/>
+          </a:prstGeom>
+          <a:ln>
+            <a:tailEnd type="triangle"/>
+          </a:ln>
+          <a:effectLst/>
+        </p:spPr>
+        <p:style>
+          <a:lnRef idx="3">
+            <a:schemeClr val="dk1"/>
+          </a:lnRef>
+          <a:fillRef idx="0">
+            <a:schemeClr val="dk1"/>
+          </a:fillRef>
+          <a:effectRef idx="2">
+            <a:schemeClr val="dk1"/>
+          </a:effectRef>
+          <a:fontRef idx="minor">
+            <a:schemeClr val="tx1"/>
+          </a:fontRef>
+        </p:style>
+      </p:cxnSp>
+      <p:cxnSp>
+        <p:nvCxnSpPr>
+          <p:cNvPr id="183" name="Straight Arrow Connector 182">
+            <a:extLst>
+              <a:ext uri="{FF2B5EF4-FFF2-40B4-BE49-F238E27FC236}">
+                <a16:creationId xmlns:a16="http://schemas.microsoft.com/office/drawing/2014/main" id="{D71C274B-2110-4E62-8552-6DDC2E7808C7}"/>
+              </a:ext>
+            </a:extLst>
+          </p:cNvPr>
+          <p:cNvCxnSpPr>
+            <a:cxnSpLocks/>
+          </p:cNvCxnSpPr>
+          <p:nvPr/>
+        </p:nvCxnSpPr>
+        <p:spPr>
+          <a:xfrm flipH="1">
+            <a:off x="6412107" y="1226477"/>
+            <a:ext cx="1749183" cy="997289"/>
+          </a:xfrm>
+          <a:prstGeom prst="straightConnector1">
+            <a:avLst/>
+          </a:prstGeom>
+          <a:ln>
+            <a:tailEnd type="triangle"/>
+          </a:ln>
+          <a:effectLst/>
+        </p:spPr>
+        <p:style>
+          <a:lnRef idx="3">
+            <a:schemeClr val="dk1"/>
+          </a:lnRef>
+          <a:fillRef idx="0">
+            <a:schemeClr val="dk1"/>
+          </a:fillRef>
+          <a:effectRef idx="2">
+            <a:schemeClr val="dk1"/>
+          </a:effectRef>
+          <a:fontRef idx="minor">
+            <a:schemeClr val="tx1"/>
+          </a:fontRef>
+        </p:style>
+      </p:cxnSp>
+      <p:sp>
+        <p:nvSpPr>
+          <p:cNvPr id="186" name="Rectangle 185">
+            <a:extLst>
+              <a:ext uri="{FF2B5EF4-FFF2-40B4-BE49-F238E27FC236}">
+                <a16:creationId xmlns:a16="http://schemas.microsoft.com/office/drawing/2014/main" id="{6D109165-DC7B-48A0-BF5F-B2C9D816A3F7}"/>
+              </a:ext>
+            </a:extLst>
+          </p:cNvPr>
+          <p:cNvSpPr/>
+          <p:nvPr/>
+        </p:nvSpPr>
+        <p:spPr>
+          <a:xfrm>
+            <a:off x="4820008" y="3301405"/>
+            <a:ext cx="1645573" cy="772580"/>
+          </a:xfrm>
+          <a:prstGeom prst="rect">
+            <a:avLst/>
+          </a:prstGeom>
+          <a:solidFill>
+            <a:schemeClr val="accent1">
+              <a:lumMod val="40000"/>
+              <a:lumOff val="60000"/>
+            </a:schemeClr>
+          </a:solidFill>
+        </p:spPr>
+        <p:style>
+          <a:lnRef idx="0">
+            <a:schemeClr val="accent1"/>
+          </a:lnRef>
+          <a:fillRef idx="3">
+            <a:schemeClr val="accent1"/>
+          </a:fillRef>
+          <a:effectRef idx="3">
+            <a:schemeClr val="accent1"/>
+          </a:effectRef>
+          <a:fontRef idx="minor">
+            <a:schemeClr val="lt1"/>
+          </a:fontRef>
+        </p:style>
+        <p:txBody>
+          <a:bodyPr rtlCol="0" anchor="ctr"/>
+          <a:lstStyle/>
+          <a:p>
+            <a:pPr algn="ctr"/>
+            <a:r>
+              <a:rPr lang="es-CO" dirty="0">
+                <a:ln>
+                  <a:solidFill>
+                    <a:schemeClr val="tx1"/>
+                  </a:solidFill>
+                </a:ln>
+                <a:solidFill>
+                  <a:schemeClr val="tx1"/>
+                </a:solidFill>
+              </a:rPr>
+              <a:t>Administración</a:t>
+            </a:r>
+          </a:p>
+          <a:p>
+            <a:pPr algn="ctr"/>
+            <a:r>
+              <a:rPr lang="es-CO" dirty="0">
+                <a:ln>
+                  <a:solidFill>
+                    <a:schemeClr val="tx1"/>
+                  </a:solidFill>
+                </a:ln>
+                <a:solidFill>
+                  <a:schemeClr val="tx1"/>
+                </a:solidFill>
+              </a:rPr>
+              <a:t>Proveedores</a:t>
+            </a:r>
+          </a:p>
+        </p:txBody>
+      </p:sp>
+      <p:sp>
+        <p:nvSpPr>
+          <p:cNvPr id="187" name="Rectangle 186">
+            <a:extLst>
+              <a:ext uri="{FF2B5EF4-FFF2-40B4-BE49-F238E27FC236}">
+                <a16:creationId xmlns:a16="http://schemas.microsoft.com/office/drawing/2014/main" id="{19F4C5F6-E230-48A9-AE9B-047C67752610}"/>
+              </a:ext>
+            </a:extLst>
+          </p:cNvPr>
+          <p:cNvSpPr/>
+          <p:nvPr/>
+        </p:nvSpPr>
+        <p:spPr>
+          <a:xfrm>
+            <a:off x="6787933" y="4045304"/>
+            <a:ext cx="1438166" cy="772580"/>
+          </a:xfrm>
+          <a:prstGeom prst="rect">
+            <a:avLst/>
+          </a:prstGeom>
+          <a:solidFill>
+            <a:schemeClr val="accent1">
+              <a:lumMod val="40000"/>
+              <a:lumOff val="60000"/>
+            </a:schemeClr>
+          </a:solidFill>
+        </p:spPr>
+        <p:style>
+          <a:lnRef idx="0">
+            <a:schemeClr val="accent1"/>
+          </a:lnRef>
+          <a:fillRef idx="3">
+            <a:schemeClr val="accent1"/>
+          </a:fillRef>
+          <a:effectRef idx="3">
+            <a:schemeClr val="accent1"/>
+          </a:effectRef>
+          <a:fontRef idx="minor">
+            <a:schemeClr val="lt1"/>
+          </a:fontRef>
+        </p:style>
+        <p:txBody>
+          <a:bodyPr rtlCol="0" anchor="ctr"/>
+          <a:lstStyle/>
+          <a:p>
+            <a:pPr algn="ctr"/>
+            <a:r>
+              <a:rPr lang="es-CO" dirty="0">
+                <a:ln>
+                  <a:solidFill>
+                    <a:schemeClr val="tx1"/>
+                  </a:solidFill>
+                </a:ln>
+                <a:solidFill>
+                  <a:schemeClr val="tx1"/>
+                </a:solidFill>
+              </a:rPr>
+              <a:t>Proveedores</a:t>
+            </a:r>
+          </a:p>
+          <a:p>
+            <a:pPr algn="ctr"/>
+            <a:r>
+              <a:rPr lang="es-CO" dirty="0">
+                <a:ln>
+                  <a:solidFill>
+                    <a:schemeClr val="tx1"/>
+                  </a:solidFill>
+                </a:ln>
+                <a:solidFill>
+                  <a:schemeClr val="tx1"/>
+                </a:solidFill>
+              </a:rPr>
+              <a:t>nuevo</a:t>
+            </a:r>
+          </a:p>
+        </p:txBody>
+      </p:sp>
+      <p:sp>
+        <p:nvSpPr>
+          <p:cNvPr id="188" name="Rectangle 187">
+            <a:extLst>
+              <a:ext uri="{FF2B5EF4-FFF2-40B4-BE49-F238E27FC236}">
+                <a16:creationId xmlns:a16="http://schemas.microsoft.com/office/drawing/2014/main" id="{4534782B-5FE2-475A-BC3C-8D858831CD4B}"/>
+              </a:ext>
+            </a:extLst>
+          </p:cNvPr>
+          <p:cNvSpPr/>
+          <p:nvPr/>
+        </p:nvSpPr>
+        <p:spPr>
+          <a:xfrm>
+            <a:off x="6817657" y="3169770"/>
+            <a:ext cx="1378719" cy="700790"/>
+          </a:xfrm>
+          <a:prstGeom prst="rect">
+            <a:avLst/>
+          </a:prstGeom>
+          <a:solidFill>
+            <a:schemeClr val="accent1">
+              <a:lumMod val="40000"/>
+              <a:lumOff val="60000"/>
+            </a:schemeClr>
+          </a:solidFill>
+        </p:spPr>
+        <p:style>
+          <a:lnRef idx="0">
+            <a:schemeClr val="accent1"/>
+          </a:lnRef>
+          <a:fillRef idx="3">
+            <a:schemeClr val="accent1"/>
+          </a:fillRef>
+          <a:effectRef idx="3">
+            <a:schemeClr val="accent1"/>
+          </a:effectRef>
+          <a:fontRef idx="minor">
+            <a:schemeClr val="lt1"/>
+          </a:fontRef>
+        </p:style>
+        <p:txBody>
+          <a:bodyPr rtlCol="0" anchor="ctr"/>
+          <a:lstStyle/>
+          <a:p>
+            <a:pPr algn="ctr"/>
+            <a:r>
+              <a:rPr lang="es-CO" dirty="0">
+                <a:ln>
+                  <a:solidFill>
+                    <a:schemeClr val="tx1"/>
+                  </a:solidFill>
+                </a:ln>
+                <a:solidFill>
+                  <a:schemeClr val="tx1"/>
+                </a:solidFill>
+              </a:rPr>
+              <a:t>Proveedores</a:t>
+            </a:r>
+          </a:p>
+          <a:p>
+            <a:pPr algn="ctr"/>
+            <a:r>
+              <a:rPr lang="es-CO" dirty="0">
+                <a:ln>
+                  <a:solidFill>
+                    <a:schemeClr val="tx1"/>
+                  </a:solidFill>
+                </a:ln>
+                <a:solidFill>
+                  <a:schemeClr val="tx1"/>
+                </a:solidFill>
+              </a:rPr>
+              <a:t>Editar</a:t>
+            </a:r>
+          </a:p>
+        </p:txBody>
+      </p:sp>
+      <p:cxnSp>
+        <p:nvCxnSpPr>
+          <p:cNvPr id="189" name="Straight Arrow Connector 188">
+            <a:extLst>
+              <a:ext uri="{FF2B5EF4-FFF2-40B4-BE49-F238E27FC236}">
+                <a16:creationId xmlns:a16="http://schemas.microsoft.com/office/drawing/2014/main" id="{9B4AD624-92AF-4661-8FFE-8F0C4865FE4E}"/>
+              </a:ext>
+            </a:extLst>
+          </p:cNvPr>
+          <p:cNvCxnSpPr>
+            <a:cxnSpLocks/>
+            <a:stCxn id="45" idx="3"/>
+            <a:endCxn id="186" idx="1"/>
+          </p:cNvCxnSpPr>
+          <p:nvPr/>
+        </p:nvCxnSpPr>
+        <p:spPr>
+          <a:xfrm>
+            <a:off x="4548259" y="3672483"/>
+            <a:ext cx="271749" cy="15212"/>
+          </a:xfrm>
+          <a:prstGeom prst="straightConnector1">
+            <a:avLst/>
+          </a:prstGeom>
+          <a:ln>
+            <a:tailEnd type="triangle"/>
+          </a:ln>
+          <a:effectLst/>
+        </p:spPr>
+        <p:style>
+          <a:lnRef idx="3">
+            <a:schemeClr val="dk1"/>
+          </a:lnRef>
+          <a:fillRef idx="0">
+            <a:schemeClr val="dk1"/>
+          </a:fillRef>
+          <a:effectRef idx="2">
+            <a:schemeClr val="dk1"/>
+          </a:effectRef>
+          <a:fontRef idx="minor">
+            <a:schemeClr val="tx1"/>
+          </a:fontRef>
+        </p:style>
+      </p:cxnSp>
+      <p:cxnSp>
+        <p:nvCxnSpPr>
+          <p:cNvPr id="193" name="Straight Arrow Connector 192">
+            <a:extLst>
+              <a:ext uri="{FF2B5EF4-FFF2-40B4-BE49-F238E27FC236}">
+                <a16:creationId xmlns:a16="http://schemas.microsoft.com/office/drawing/2014/main" id="{7D15B493-9D74-4469-9CE2-9E3C118E4354}"/>
+              </a:ext>
+            </a:extLst>
+          </p:cNvPr>
+          <p:cNvCxnSpPr>
+            <a:cxnSpLocks/>
+            <a:endCxn id="188" idx="1"/>
+          </p:cNvCxnSpPr>
+          <p:nvPr/>
+        </p:nvCxnSpPr>
+        <p:spPr>
+          <a:xfrm flipV="1">
+            <a:off x="6429152" y="3520165"/>
+            <a:ext cx="388505" cy="66302"/>
+          </a:xfrm>
+          <a:prstGeom prst="straightConnector1">
+            <a:avLst/>
+          </a:prstGeom>
+          <a:ln>
+            <a:tailEnd type="triangle"/>
+          </a:ln>
+          <a:effectLst/>
+        </p:spPr>
+        <p:style>
+          <a:lnRef idx="3">
+            <a:schemeClr val="dk1"/>
+          </a:lnRef>
+          <a:fillRef idx="0">
+            <a:schemeClr val="dk1"/>
+          </a:fillRef>
+          <a:effectRef idx="2">
+            <a:schemeClr val="dk1"/>
+          </a:effectRef>
+          <a:fontRef idx="minor">
+            <a:schemeClr val="tx1"/>
+          </a:fontRef>
+        </p:style>
+      </p:cxnSp>
+      <p:cxnSp>
+        <p:nvCxnSpPr>
+          <p:cNvPr id="195" name="Straight Arrow Connector 194">
+            <a:extLst>
+              <a:ext uri="{FF2B5EF4-FFF2-40B4-BE49-F238E27FC236}">
+                <a16:creationId xmlns:a16="http://schemas.microsoft.com/office/drawing/2014/main" id="{F5D933DD-7A08-49E0-92D8-423AA58F2C34}"/>
+              </a:ext>
+            </a:extLst>
+          </p:cNvPr>
+          <p:cNvCxnSpPr>
+            <a:cxnSpLocks/>
+            <a:endCxn id="187" idx="1"/>
+          </p:cNvCxnSpPr>
+          <p:nvPr/>
+        </p:nvCxnSpPr>
+        <p:spPr>
+          <a:xfrm>
+            <a:off x="6361878" y="4035367"/>
+            <a:ext cx="426055" cy="396227"/>
+          </a:xfrm>
+          <a:prstGeom prst="straightConnector1">
+            <a:avLst/>
+          </a:prstGeom>
+          <a:ln>
+            <a:tailEnd type="triangle"/>
+          </a:ln>
+          <a:effectLst/>
+        </p:spPr>
+        <p:style>
+          <a:lnRef idx="3">
+            <a:schemeClr val="dk1"/>
+          </a:lnRef>
+          <a:fillRef idx="0">
+            <a:schemeClr val="dk1"/>
+          </a:fillRef>
+          <a:effectRef idx="2">
+            <a:schemeClr val="dk1"/>
+          </a:effectRef>
+          <a:fontRef idx="minor">
+            <a:schemeClr val="tx1"/>
+          </a:fontRef>
+        </p:style>
+      </p:cxnSp>
+      <p:sp>
+        <p:nvSpPr>
+          <p:cNvPr id="201" name="Rectangle 200">
+            <a:extLst>
+              <a:ext uri="{FF2B5EF4-FFF2-40B4-BE49-F238E27FC236}">
+                <a16:creationId xmlns:a16="http://schemas.microsoft.com/office/drawing/2014/main" id="{A084D807-AF7D-409F-BA44-5B1A93830C3B}"/>
+              </a:ext>
+            </a:extLst>
+          </p:cNvPr>
+          <p:cNvSpPr/>
+          <p:nvPr/>
+        </p:nvSpPr>
+        <p:spPr>
+          <a:xfrm>
+            <a:off x="10639109" y="2356737"/>
+            <a:ext cx="1289912" cy="596329"/>
+          </a:xfrm>
+          <a:prstGeom prst="rect">
+            <a:avLst/>
+          </a:prstGeom>
+          <a:solidFill>
+            <a:schemeClr val="accent1">
+              <a:lumMod val="40000"/>
+              <a:lumOff val="60000"/>
+            </a:schemeClr>
+          </a:solidFill>
+        </p:spPr>
+        <p:style>
+          <a:lnRef idx="0">
+            <a:schemeClr val="accent1"/>
+          </a:lnRef>
+          <a:fillRef idx="3">
+            <a:schemeClr val="accent1"/>
+          </a:fillRef>
+          <a:effectRef idx="3">
+            <a:schemeClr val="accent1"/>
+          </a:effectRef>
+          <a:fontRef idx="minor">
+            <a:schemeClr val="lt1"/>
+          </a:fontRef>
+        </p:style>
+        <p:txBody>
+          <a:bodyPr rtlCol="0" anchor="ctr"/>
+          <a:lstStyle/>
+          <a:p>
+            <a:pPr algn="ctr"/>
+            <a:r>
+              <a:rPr lang="es-CO" dirty="0">
+                <a:ln>
+                  <a:solidFill>
+                    <a:schemeClr val="tx1"/>
+                  </a:solidFill>
+                </a:ln>
+                <a:solidFill>
+                  <a:schemeClr val="tx1"/>
+                </a:solidFill>
+              </a:rPr>
+              <a:t>Calculo de Gastos</a:t>
+            </a:r>
+          </a:p>
+        </p:txBody>
+      </p:sp>
+      <p:cxnSp>
+        <p:nvCxnSpPr>
+          <p:cNvPr id="202" name="Straight Arrow Connector 201">
+            <a:extLst>
+              <a:ext uri="{FF2B5EF4-FFF2-40B4-BE49-F238E27FC236}">
+                <a16:creationId xmlns:a16="http://schemas.microsoft.com/office/drawing/2014/main" id="{9F66C0DA-8564-4B52-AEF1-6F9F390B5088}"/>
+              </a:ext>
+            </a:extLst>
+          </p:cNvPr>
+          <p:cNvCxnSpPr>
+            <a:cxnSpLocks/>
+            <a:endCxn id="201" idx="0"/>
+          </p:cNvCxnSpPr>
+          <p:nvPr/>
+        </p:nvCxnSpPr>
+        <p:spPr>
+          <a:xfrm>
+            <a:off x="8698486" y="1158486"/>
+            <a:ext cx="2585579" cy="1198251"/>
+          </a:xfrm>
+          <a:prstGeom prst="straightConnector1">
+            <a:avLst/>
+          </a:prstGeom>
+          <a:ln>
+            <a:tailEnd type="triangle"/>
+          </a:ln>
+          <a:effectLst/>
+        </p:spPr>
+        <p:style>
+          <a:lnRef idx="3">
+            <a:schemeClr val="dk1"/>
+          </a:lnRef>
+          <a:fillRef idx="0">
+            <a:schemeClr val="dk1"/>
+          </a:fillRef>
+          <a:effectRef idx="2">
+            <a:schemeClr val="dk1"/>
+          </a:effectRef>
+          <a:fontRef idx="minor">
+            <a:schemeClr val="tx1"/>
+          </a:fontRef>
+        </p:style>
+      </p:cxnSp>
+      <p:sp>
+        <p:nvSpPr>
+          <p:cNvPr id="206" name="Rectangle 205">
+            <a:extLst>
+              <a:ext uri="{FF2B5EF4-FFF2-40B4-BE49-F238E27FC236}">
+                <a16:creationId xmlns:a16="http://schemas.microsoft.com/office/drawing/2014/main" id="{07D5DC74-E39E-42EB-886F-860312CD1EAF}"/>
+              </a:ext>
+            </a:extLst>
+          </p:cNvPr>
+          <p:cNvSpPr/>
+          <p:nvPr/>
+        </p:nvSpPr>
+        <p:spPr>
+          <a:xfrm>
+            <a:off x="9077453" y="2683106"/>
+            <a:ext cx="1645574" cy="456077"/>
+          </a:xfrm>
+          <a:prstGeom prst="rect">
+            <a:avLst/>
+          </a:prstGeom>
+          <a:solidFill>
+            <a:schemeClr val="accent1">
+              <a:lumMod val="40000"/>
+              <a:lumOff val="60000"/>
+            </a:schemeClr>
+          </a:solidFill>
+        </p:spPr>
+        <p:style>
+          <a:lnRef idx="0">
+            <a:schemeClr val="accent1"/>
+          </a:lnRef>
+          <a:fillRef idx="3">
+            <a:schemeClr val="accent1"/>
+          </a:fillRef>
+          <a:effectRef idx="3">
+            <a:schemeClr val="accent1"/>
+          </a:effectRef>
+          <a:fontRef idx="minor">
+            <a:schemeClr val="lt1"/>
+          </a:fontRef>
+        </p:style>
+        <p:txBody>
+          <a:bodyPr rtlCol="0" anchor="ctr"/>
+          <a:lstStyle/>
+          <a:p>
+            <a:pPr algn="ctr"/>
+            <a:r>
+              <a:rPr lang="es-CO" dirty="0">
+                <a:ln>
+                  <a:solidFill>
+                    <a:schemeClr val="tx1"/>
+                  </a:solidFill>
+                </a:ln>
+                <a:solidFill>
+                  <a:schemeClr val="tx1"/>
+                </a:solidFill>
+              </a:rPr>
+              <a:t>Alerta Insumos</a:t>
+            </a:r>
+          </a:p>
+        </p:txBody>
+      </p:sp>
+      <p:cxnSp>
+        <p:nvCxnSpPr>
+          <p:cNvPr id="211" name="Straight Arrow Connector 210">
+            <a:extLst>
+              <a:ext uri="{FF2B5EF4-FFF2-40B4-BE49-F238E27FC236}">
+                <a16:creationId xmlns:a16="http://schemas.microsoft.com/office/drawing/2014/main" id="{DC87B5FA-4247-4EF5-8453-95257D2531B2}"/>
+              </a:ext>
+            </a:extLst>
+          </p:cNvPr>
+          <p:cNvCxnSpPr>
+            <a:cxnSpLocks/>
+          </p:cNvCxnSpPr>
+          <p:nvPr/>
+        </p:nvCxnSpPr>
+        <p:spPr>
+          <a:xfrm>
+            <a:off x="8609679" y="1212709"/>
+            <a:ext cx="1468367" cy="1483012"/>
+          </a:xfrm>
+          <a:prstGeom prst="straightConnector1">
+            <a:avLst/>
+          </a:prstGeom>
+          <a:ln>
+            <a:tailEnd type="triangle"/>
+          </a:ln>
+          <a:effectLst/>
+        </p:spPr>
+        <p:style>
+          <a:lnRef idx="3">
+            <a:schemeClr val="dk1"/>
+          </a:lnRef>
+          <a:fillRef idx="0">
+            <a:schemeClr val="dk1"/>
+          </a:fillRef>
+          <a:effectRef idx="2">
+            <a:schemeClr val="dk1"/>
+          </a:effectRef>
+          <a:fontRef idx="minor">
+            <a:schemeClr val="tx1"/>
+          </a:fontRef>
+        </p:style>
+      </p:cxnSp>
+      <p:sp>
+        <p:nvSpPr>
+          <p:cNvPr id="215" name="Rectangle 214">
+            <a:extLst>
+              <a:ext uri="{FF2B5EF4-FFF2-40B4-BE49-F238E27FC236}">
+                <a16:creationId xmlns:a16="http://schemas.microsoft.com/office/drawing/2014/main" id="{244C1EE1-6A3B-4489-A705-0B31F83090F6}"/>
+              </a:ext>
+            </a:extLst>
+          </p:cNvPr>
+          <p:cNvSpPr/>
+          <p:nvPr/>
+        </p:nvSpPr>
+        <p:spPr>
+          <a:xfrm>
+            <a:off x="5707193" y="5108165"/>
+            <a:ext cx="1645574" cy="456077"/>
+          </a:xfrm>
+          <a:prstGeom prst="rect">
+            <a:avLst/>
+          </a:prstGeom>
+          <a:solidFill>
+            <a:schemeClr val="accent1">
+              <a:lumMod val="40000"/>
+              <a:lumOff val="60000"/>
+            </a:schemeClr>
+          </a:solidFill>
+        </p:spPr>
+        <p:style>
+          <a:lnRef idx="0">
+            <a:schemeClr val="accent1"/>
+          </a:lnRef>
+          <a:fillRef idx="3">
+            <a:schemeClr val="accent1"/>
+          </a:fillRef>
+          <a:effectRef idx="3">
+            <a:schemeClr val="accent1"/>
+          </a:effectRef>
+          <a:fontRef idx="minor">
+            <a:schemeClr val="lt1"/>
+          </a:fontRef>
+        </p:style>
+        <p:txBody>
+          <a:bodyPr rtlCol="0" anchor="ctr"/>
+          <a:lstStyle/>
+          <a:p>
+            <a:pPr algn="ctr"/>
+            <a:r>
+              <a:rPr lang="es-CO" dirty="0">
+                <a:ln>
+                  <a:solidFill>
+                    <a:schemeClr val="tx1"/>
+                  </a:solidFill>
+                </a:ln>
+                <a:solidFill>
+                  <a:schemeClr val="tx1"/>
+                </a:solidFill>
+              </a:rPr>
+              <a:t>Alerta Pacientes</a:t>
+            </a:r>
+          </a:p>
+        </p:txBody>
+      </p:sp>
+      <p:cxnSp>
+        <p:nvCxnSpPr>
+          <p:cNvPr id="216" name="Straight Arrow Connector 215">
+            <a:extLst>
+              <a:ext uri="{FF2B5EF4-FFF2-40B4-BE49-F238E27FC236}">
+                <a16:creationId xmlns:a16="http://schemas.microsoft.com/office/drawing/2014/main" id="{B051C092-822E-4300-B35E-C1826B0EB24C}"/>
+              </a:ext>
+            </a:extLst>
+          </p:cNvPr>
+          <p:cNvCxnSpPr>
+            <a:cxnSpLocks/>
+          </p:cNvCxnSpPr>
+          <p:nvPr/>
+        </p:nvCxnSpPr>
+        <p:spPr>
+          <a:xfrm>
+            <a:off x="4186940" y="4259525"/>
+            <a:ext cx="1698607" cy="827305"/>
           </a:xfrm>
           <a:prstGeom prst="straightConnector1">
             <a:avLst/>

</xml_diff>